<commit_message>
rmarkdown powerpoint, challenges, notes, as well as challenge examples and capstone solutions. ggplot challenge solutions in pdf
</commit_message>
<xml_diff>
--- a/MariaKamenetsky_Jan2019/DC_ggplot2_jan2019.pptx
+++ b/MariaKamenetsky_Jan2019/DC_ggplot2_jan2019.pptx
@@ -352,7 +352,7 @@
           <a:p>
             <a:fld id="{1F3EA2CB-D5D9-47BB-B887-53EFEBA2B365}" type="datetimeFigureOut">
               <a:rPr lang="en-US" smtClean="0"/>
-              <a:t>1/5/2019</a:t>
+              <a:t>1/6/2019</a:t>
             </a:fld>
             <a:endParaRPr lang="en-US"/>
           </a:p>
@@ -560,7 +560,7 @@
           <a:p>
             <a:fld id="{1F3EA2CB-D5D9-47BB-B887-53EFEBA2B365}" type="datetimeFigureOut">
               <a:rPr lang="en-US" smtClean="0"/>
-              <a:t>1/5/2019</a:t>
+              <a:t>1/6/2019</a:t>
             </a:fld>
             <a:endParaRPr lang="en-US"/>
           </a:p>
@@ -816,7 +816,7 @@
           <a:p>
             <a:fld id="{1F3EA2CB-D5D9-47BB-B887-53EFEBA2B365}" type="datetimeFigureOut">
               <a:rPr lang="en-US" smtClean="0"/>
-              <a:t>1/5/2019</a:t>
+              <a:t>1/6/2019</a:t>
             </a:fld>
             <a:endParaRPr lang="en-US"/>
           </a:p>
@@ -986,7 +986,7 @@
           <a:p>
             <a:fld id="{1F3EA2CB-D5D9-47BB-B887-53EFEBA2B365}" type="datetimeFigureOut">
               <a:rPr lang="en-US" smtClean="0"/>
-              <a:t>1/5/2019</a:t>
+              <a:t>1/6/2019</a:t>
             </a:fld>
             <a:endParaRPr lang="en-US"/>
           </a:p>
@@ -1329,7 +1329,7 @@
           <a:p>
             <a:fld id="{1F3EA2CB-D5D9-47BB-B887-53EFEBA2B365}" type="datetimeFigureOut">
               <a:rPr lang="en-US" smtClean="0"/>
-              <a:t>1/5/2019</a:t>
+              <a:t>1/6/2019</a:t>
             </a:fld>
             <a:endParaRPr lang="en-US"/>
           </a:p>
@@ -1604,7 +1604,7 @@
           <a:p>
             <a:fld id="{1F3EA2CB-D5D9-47BB-B887-53EFEBA2B365}" type="datetimeFigureOut">
               <a:rPr lang="en-US" smtClean="0"/>
-              <a:t>1/5/2019</a:t>
+              <a:t>1/6/2019</a:t>
             </a:fld>
             <a:endParaRPr lang="en-US"/>
           </a:p>
@@ -1983,7 +1983,7 @@
           <a:p>
             <a:fld id="{1F3EA2CB-D5D9-47BB-B887-53EFEBA2B365}" type="datetimeFigureOut">
               <a:rPr lang="en-US" smtClean="0"/>
-              <a:t>1/5/2019</a:t>
+              <a:t>1/6/2019</a:t>
             </a:fld>
             <a:endParaRPr lang="en-US"/>
           </a:p>
@@ -2101,7 +2101,7 @@
           <a:p>
             <a:fld id="{1F3EA2CB-D5D9-47BB-B887-53EFEBA2B365}" type="datetimeFigureOut">
               <a:rPr lang="en-US" smtClean="0"/>
-              <a:t>1/5/2019</a:t>
+              <a:t>1/6/2019</a:t>
             </a:fld>
             <a:endParaRPr lang="en-US"/>
           </a:p>
@@ -2272,7 +2272,7 @@
           <a:p>
             <a:fld id="{1F3EA2CB-D5D9-47BB-B887-53EFEBA2B365}" type="datetimeFigureOut">
               <a:rPr lang="en-US" smtClean="0"/>
-              <a:t>1/5/2019</a:t>
+              <a:t>1/6/2019</a:t>
             </a:fld>
             <a:endParaRPr lang="en-US"/>
           </a:p>
@@ -2626,7 +2626,7 @@
           <a:p>
             <a:fld id="{1F3EA2CB-D5D9-47BB-B887-53EFEBA2B365}" type="datetimeFigureOut">
               <a:rPr lang="en-US" smtClean="0"/>
-              <a:t>1/5/2019</a:t>
+              <a:t>1/6/2019</a:t>
             </a:fld>
             <a:endParaRPr lang="en-US"/>
           </a:p>
@@ -3003,7 +3003,7 @@
           <a:p>
             <a:fld id="{1F3EA2CB-D5D9-47BB-B887-53EFEBA2B365}" type="datetimeFigureOut">
               <a:rPr lang="en-US" smtClean="0"/>
-              <a:t>1/5/2019</a:t>
+              <a:t>1/6/2019</a:t>
             </a:fld>
             <a:endParaRPr lang="en-US"/>
           </a:p>
@@ -3290,7 +3290,7 @@
           <a:p>
             <a:fld id="{1F3EA2CB-D5D9-47BB-B887-53EFEBA2B365}" type="datetimeFigureOut">
               <a:rPr lang="en-US" smtClean="0"/>
-              <a:t>1/5/2019</a:t>
+              <a:t>1/6/2019</a:t>
             </a:fld>
             <a:endParaRPr lang="en-US"/>
           </a:p>
@@ -4166,6 +4166,44 @@
           </a:fontRef>
         </p:style>
       </p:sp>
+      <p:sp>
+        <p:nvSpPr>
+          <p:cNvPr id="4" name="Rectangle 3">
+            <a:extLst>
+              <a:ext uri="{FF2B5EF4-FFF2-40B4-BE49-F238E27FC236}">
+                <a16:creationId xmlns:a16="http://schemas.microsoft.com/office/drawing/2014/main" id="{592FCE6E-59FC-4BC1-8653-004AB29884F8}"/>
+              </a:ext>
+            </a:extLst>
+          </p:cNvPr>
+          <p:cNvSpPr/>
+          <p:nvPr/>
+        </p:nvSpPr>
+        <p:spPr>
+          <a:xfrm>
+            <a:off x="6369367" y="6444734"/>
+            <a:ext cx="5641416" cy="369332"/>
+          </a:xfrm>
+          <a:prstGeom prst="rect">
+            <a:avLst/>
+          </a:prstGeom>
+        </p:spPr>
+        <p:txBody>
+          <a:bodyPr wrap="none">
+            <a:spAutoFit/>
+          </a:bodyPr>
+          <a:lstStyle/>
+          <a:p>
+            <a:r>
+              <a:rPr lang="en-US" dirty="0">
+                <a:solidFill>
+                  <a:schemeClr val="bg1"/>
+                </a:solidFill>
+              </a:rPr>
+              <a:t>Adapted from Karl Broman and Data Carpentry curriculum</a:t>
+            </a:r>
+          </a:p>
+        </p:txBody>
+      </p:sp>
     </p:spTree>
     <p:extLst>
       <p:ext uri="{BB962C8B-B14F-4D97-AF65-F5344CB8AC3E}">

</xml_diff>

<commit_message>
changed from 3 to 4 datasets to create for visualization in data prep step - updated powerpoint
</commit_message>
<xml_diff>
--- a/MariaKamenetsky_Jan2019/DC_ggplot2_jan2019.pptx
+++ b/MariaKamenetsky_Jan2019/DC_ggplot2_jan2019.pptx
@@ -352,7 +352,7 @@
           <a:p>
             <a:fld id="{1F3EA2CB-D5D9-47BB-B887-53EFEBA2B365}" type="datetimeFigureOut">
               <a:rPr lang="en-US" smtClean="0"/>
-              <a:t>1/6/2019</a:t>
+              <a:t>1/16/2019</a:t>
             </a:fld>
             <a:endParaRPr lang="en-US"/>
           </a:p>
@@ -560,7 +560,7 @@
           <a:p>
             <a:fld id="{1F3EA2CB-D5D9-47BB-B887-53EFEBA2B365}" type="datetimeFigureOut">
               <a:rPr lang="en-US" smtClean="0"/>
-              <a:t>1/6/2019</a:t>
+              <a:t>1/16/2019</a:t>
             </a:fld>
             <a:endParaRPr lang="en-US"/>
           </a:p>
@@ -816,7 +816,7 @@
           <a:p>
             <a:fld id="{1F3EA2CB-D5D9-47BB-B887-53EFEBA2B365}" type="datetimeFigureOut">
               <a:rPr lang="en-US" smtClean="0"/>
-              <a:t>1/6/2019</a:t>
+              <a:t>1/16/2019</a:t>
             </a:fld>
             <a:endParaRPr lang="en-US"/>
           </a:p>
@@ -986,7 +986,7 @@
           <a:p>
             <a:fld id="{1F3EA2CB-D5D9-47BB-B887-53EFEBA2B365}" type="datetimeFigureOut">
               <a:rPr lang="en-US" smtClean="0"/>
-              <a:t>1/6/2019</a:t>
+              <a:t>1/16/2019</a:t>
             </a:fld>
             <a:endParaRPr lang="en-US"/>
           </a:p>
@@ -1329,7 +1329,7 @@
           <a:p>
             <a:fld id="{1F3EA2CB-D5D9-47BB-B887-53EFEBA2B365}" type="datetimeFigureOut">
               <a:rPr lang="en-US" smtClean="0"/>
-              <a:t>1/6/2019</a:t>
+              <a:t>1/16/2019</a:t>
             </a:fld>
             <a:endParaRPr lang="en-US"/>
           </a:p>
@@ -1604,7 +1604,7 @@
           <a:p>
             <a:fld id="{1F3EA2CB-D5D9-47BB-B887-53EFEBA2B365}" type="datetimeFigureOut">
               <a:rPr lang="en-US" smtClean="0"/>
-              <a:t>1/6/2019</a:t>
+              <a:t>1/16/2019</a:t>
             </a:fld>
             <a:endParaRPr lang="en-US"/>
           </a:p>
@@ -1983,7 +1983,7 @@
           <a:p>
             <a:fld id="{1F3EA2CB-D5D9-47BB-B887-53EFEBA2B365}" type="datetimeFigureOut">
               <a:rPr lang="en-US" smtClean="0"/>
-              <a:t>1/6/2019</a:t>
+              <a:t>1/16/2019</a:t>
             </a:fld>
             <a:endParaRPr lang="en-US"/>
           </a:p>
@@ -2101,7 +2101,7 @@
           <a:p>
             <a:fld id="{1F3EA2CB-D5D9-47BB-B887-53EFEBA2B365}" type="datetimeFigureOut">
               <a:rPr lang="en-US" smtClean="0"/>
-              <a:t>1/6/2019</a:t>
+              <a:t>1/16/2019</a:t>
             </a:fld>
             <a:endParaRPr lang="en-US"/>
           </a:p>
@@ -2272,7 +2272,7 @@
           <a:p>
             <a:fld id="{1F3EA2CB-D5D9-47BB-B887-53EFEBA2B365}" type="datetimeFigureOut">
               <a:rPr lang="en-US" smtClean="0"/>
-              <a:t>1/6/2019</a:t>
+              <a:t>1/16/2019</a:t>
             </a:fld>
             <a:endParaRPr lang="en-US"/>
           </a:p>
@@ -2626,7 +2626,7 @@
           <a:p>
             <a:fld id="{1F3EA2CB-D5D9-47BB-B887-53EFEBA2B365}" type="datetimeFigureOut">
               <a:rPr lang="en-US" smtClean="0"/>
-              <a:t>1/6/2019</a:t>
+              <a:t>1/16/2019</a:t>
             </a:fld>
             <a:endParaRPr lang="en-US"/>
           </a:p>
@@ -3003,7 +3003,7 @@
           <a:p>
             <a:fld id="{1F3EA2CB-D5D9-47BB-B887-53EFEBA2B365}" type="datetimeFigureOut">
               <a:rPr lang="en-US" smtClean="0"/>
-              <a:t>1/6/2019</a:t>
+              <a:t>1/16/2019</a:t>
             </a:fld>
             <a:endParaRPr lang="en-US"/>
           </a:p>
@@ -3290,7 +3290,7 @@
           <a:p>
             <a:fld id="{1F3EA2CB-D5D9-47BB-B887-53EFEBA2B365}" type="datetimeFigureOut">
               <a:rPr lang="en-US" smtClean="0"/>
-              <a:t>1/6/2019</a:t>
+              <a:t>1/16/2019</a:t>
             </a:fld>
             <a:endParaRPr lang="en-US"/>
           </a:p>
@@ -6383,7 +6383,7 @@
         <p:spPr>
           <a:xfrm>
             <a:off x="659219" y="1307805"/>
-            <a:ext cx="9750055" cy="3970318"/>
+            <a:ext cx="9750055" cy="5386090"/>
           </a:xfrm>
           <a:prstGeom prst="rect">
             <a:avLst/>
@@ -6398,7 +6398,7 @@
           <a:p>
             <a:r>
               <a:rPr lang="en-US" sz="3200" dirty="0"/>
-              <a:t>Create 3 datasets using </a:t>
+              <a:t>Create 4 datasets using </a:t>
             </a:r>
             <a:r>
               <a:rPr lang="en-US" sz="3200" dirty="0" err="1">
@@ -6493,9 +6493,55 @@
               <a:buChar char="•"/>
             </a:pPr>
             <a:r>
+              <a:rPr lang="en-US" sz="2000" dirty="0">
+                <a:solidFill>
+                  <a:prstClr val="black"/>
+                </a:solidFill>
+              </a:rPr>
+              <a:t>Mean weight, mean height, and observation count by species, year, and sex.</a:t>
+            </a:r>
+            <a:endParaRPr lang="en-US" sz="3200" b="1" dirty="0">
+              <a:latin typeface="Courier New" panose="02070309020205020404" pitchFamily="49" charset="0"/>
+              <a:cs typeface="Courier New" panose="02070309020205020404" pitchFamily="49" charset="0"/>
+            </a:endParaRPr>
+          </a:p>
+          <a:p>
+            <a:pPr marL="971550" lvl="1" indent="-514350">
+              <a:buFont typeface="+mj-lt"/>
+              <a:buAutoNum type="arabicPeriod"/>
+            </a:pPr>
+            <a:r>
+              <a:rPr lang="en-US" sz="3200" b="1" dirty="0" err="1">
+                <a:latin typeface="Courier New" panose="02070309020205020404" pitchFamily="49" charset="0"/>
+                <a:cs typeface="Courier New" panose="02070309020205020404" pitchFamily="49" charset="0"/>
+              </a:rPr>
+              <a:t>count_by_year</a:t>
+            </a:r>
+            <a:endParaRPr lang="en-US" sz="3200" b="1" dirty="0">
+              <a:latin typeface="Courier New" panose="02070309020205020404" pitchFamily="49" charset="0"/>
+              <a:cs typeface="Courier New" panose="02070309020205020404" pitchFamily="49" charset="0"/>
+            </a:endParaRPr>
+          </a:p>
+          <a:p>
+            <a:pPr marL="1428750" lvl="2" indent="-514350">
+              <a:buFont typeface="Arial" panose="020B0604020202020204" pitchFamily="34" charset="0"/>
+              <a:buChar char="•"/>
+            </a:pPr>
+            <a:r>
               <a:rPr lang="en-US" sz="2000" dirty="0"/>
-              <a:t>Mean weight, mean height, and observation count by species, year, and sex.</a:t>
-            </a:r>
+              <a:t>Observation count by year.</a:t>
+            </a:r>
+          </a:p>
+          <a:p>
+            <a:pPr lvl="2"/>
+            <a:endParaRPr lang="en-US" sz="2000" dirty="0"/>
+          </a:p>
+          <a:p>
+            <a:pPr marL="1428750" lvl="2" indent="-514350">
+              <a:buFont typeface="Arial" panose="020B0604020202020204" pitchFamily="34" charset="0"/>
+              <a:buChar char="•"/>
+            </a:pPr>
+            <a:endParaRPr lang="en-US" sz="2000" dirty="0"/>
           </a:p>
           <a:p>
             <a:endParaRPr lang="en-US" sz="3200" dirty="0"/>

</xml_diff>